<commit_message>
added build and github info in ppt
</commit_message>
<xml_diff>
--- a/Architecture-CampaignManagementSystem.pptx
+++ b/Architecture-CampaignManagementSystem.pptx
@@ -12,6 +12,7 @@
     <p:sldId id="257" r:id="rId6"/>
     <p:sldId id="261" r:id="rId7"/>
     <p:sldId id="262" r:id="rId8"/>
+    <p:sldId id="264" r:id="rId9"/>
   </p:sldIdLst>
   <p:sldSz cx="12192000" cy="6858000"/>
   <p:notesSz cx="6858000" cy="9144000"/>
@@ -5694,6 +5695,568 @@
 </p:sld>
 </file>
 
+<file path=ppt/slides/slide8.xml><?xml version="1.0" encoding="utf-8"?>
+<p:sld xmlns:a="http://schemas.openxmlformats.org/drawingml/2006/main" xmlns:r="http://schemas.openxmlformats.org/officeDocument/2006/relationships" xmlns:p="http://schemas.openxmlformats.org/presentationml/2006/main">
+  <p:cSld>
+    <p:spTree>
+      <p:nvGrpSpPr>
+        <p:cNvPr id="1" name=""/>
+        <p:cNvGrpSpPr/>
+        <p:nvPr/>
+      </p:nvGrpSpPr>
+      <p:grpSpPr>
+        <a:xfrm>
+          <a:off x="0" y="0"/>
+          <a:ext cx="0" cy="0"/>
+          <a:chOff x="0" y="0"/>
+          <a:chExt cx="0" cy="0"/>
+        </a:xfrm>
+      </p:grpSpPr>
+      <p:sp>
+        <p:nvSpPr>
+          <p:cNvPr id="2" name="Title 1">
+            <a:extLst>
+              <a:ext uri="{FF2B5EF4-FFF2-40B4-BE49-F238E27FC236}">
+                <a16:creationId xmlns:a16="http://schemas.microsoft.com/office/drawing/2014/main" id="{245EC065-658C-8A39-DED0-94F540A5EA11}"/>
+              </a:ext>
+            </a:extLst>
+          </p:cNvPr>
+          <p:cNvSpPr>
+            <a:spLocks noGrp="1"/>
+          </p:cNvSpPr>
+          <p:nvPr>
+            <p:ph type="title"/>
+          </p:nvPr>
+        </p:nvSpPr>
+        <p:spPr>
+          <a:xfrm>
+            <a:off x="838200" y="365125"/>
+            <a:ext cx="10515600" cy="596409"/>
+          </a:xfrm>
+        </p:spPr>
+        <p:txBody>
+          <a:bodyPr>
+            <a:normAutofit fontScale="90000"/>
+          </a:bodyPr>
+          <a:lstStyle/>
+          <a:p>
+            <a:r>
+              <a:rPr lang="en-US" dirty="0"/>
+              <a:t>Code samples</a:t>
+            </a:r>
+          </a:p>
+        </p:txBody>
+      </p:sp>
+      <p:sp>
+        <p:nvSpPr>
+          <p:cNvPr id="4" name="Rectangle 1">
+            <a:extLst>
+              <a:ext uri="{FF2B5EF4-FFF2-40B4-BE49-F238E27FC236}">
+                <a16:creationId xmlns:a16="http://schemas.microsoft.com/office/drawing/2014/main" id="{C9C14D41-E3D1-08FA-71B5-C03D50BEC261}"/>
+              </a:ext>
+            </a:extLst>
+          </p:cNvPr>
+          <p:cNvSpPr>
+            <a:spLocks noGrp="1" noChangeArrowheads="1"/>
+          </p:cNvSpPr>
+          <p:nvPr>
+            <p:ph idx="1"/>
+          </p:nvPr>
+        </p:nvSpPr>
+        <p:spPr bwMode="auto">
+          <a:xfrm>
+            <a:off x="697584" y="1529359"/>
+            <a:ext cx="9370243" cy="2031325"/>
+          </a:xfrm>
+          <a:prstGeom prst="rect">
+            <a:avLst/>
+          </a:prstGeom>
+          <a:solidFill>
+            <a:srgbClr val="FFFFFF"/>
+          </a:solidFill>
+          <a:ln>
+            <a:noFill/>
+          </a:ln>
+          <a:effectLst/>
+          <a:extLst>
+            <a:ext uri="{91240B29-F687-4F45-9708-019B960494DF}">
+              <a14:hiddenLine xmlns:a14="http://schemas.microsoft.com/office/drawing/2010/main" w="9525">
+                <a:solidFill>
+                  <a:schemeClr val="tx1"/>
+                </a:solidFill>
+                <a:miter lim="800000"/>
+                <a:headEnd/>
+                <a:tailEnd/>
+              </a14:hiddenLine>
+            </a:ext>
+            <a:ext uri="{AF507438-7753-43E0-B8FC-AC1667EBCBE1}">
+              <a14:hiddenEffects xmlns:a14="http://schemas.microsoft.com/office/drawing/2010/main">
+                <a:effectLst>
+                  <a:outerShdw dist="35921" dir="2700000" algn="ctr" rotWithShape="0">
+                    <a:schemeClr val="bg2"/>
+                  </a:outerShdw>
+                </a:effectLst>
+              </a14:hiddenEffects>
+            </a:ext>
+          </a:extLst>
+        </p:spPr>
+        <p:txBody>
+          <a:bodyPr vert="horz" wrap="square" lIns="91440" tIns="45720" rIns="91440" bIns="45720" numCol="1" anchor="ctr" anchorCtr="0" compatLnSpc="1">
+            <a:prstTxWarp prst="textNoShape">
+              <a:avLst/>
+            </a:prstTxWarp>
+            <a:spAutoFit/>
+          </a:bodyPr>
+          <a:lstStyle>
+            <a:lvl1pPr eaLnBrk="0" fontAlgn="base" hangingPunct="0">
+              <a:spcBef>
+                <a:spcPct val="0"/>
+              </a:spcBef>
+              <a:spcAft>
+                <a:spcPct val="0"/>
+              </a:spcAft>
+              <a:defRPr>
+                <a:solidFill>
+                  <a:schemeClr val="tx1"/>
+                </a:solidFill>
+                <a:latin typeface="Arial" panose="020B0604020202020204" pitchFamily="34" charset="0"/>
+              </a:defRPr>
+            </a:lvl1pPr>
+            <a:lvl2pPr eaLnBrk="0" fontAlgn="base" hangingPunct="0">
+              <a:spcBef>
+                <a:spcPct val="0"/>
+              </a:spcBef>
+              <a:spcAft>
+                <a:spcPct val="0"/>
+              </a:spcAft>
+              <a:defRPr>
+                <a:solidFill>
+                  <a:schemeClr val="tx1"/>
+                </a:solidFill>
+                <a:latin typeface="Arial" panose="020B0604020202020204" pitchFamily="34" charset="0"/>
+              </a:defRPr>
+            </a:lvl2pPr>
+            <a:lvl3pPr eaLnBrk="0" fontAlgn="base" hangingPunct="0">
+              <a:spcBef>
+                <a:spcPct val="0"/>
+              </a:spcBef>
+              <a:spcAft>
+                <a:spcPct val="0"/>
+              </a:spcAft>
+              <a:defRPr>
+                <a:solidFill>
+                  <a:schemeClr val="tx1"/>
+                </a:solidFill>
+                <a:latin typeface="Arial" panose="020B0604020202020204" pitchFamily="34" charset="0"/>
+              </a:defRPr>
+            </a:lvl3pPr>
+            <a:lvl4pPr eaLnBrk="0" fontAlgn="base" hangingPunct="0">
+              <a:spcBef>
+                <a:spcPct val="0"/>
+              </a:spcBef>
+              <a:spcAft>
+                <a:spcPct val="0"/>
+              </a:spcAft>
+              <a:defRPr>
+                <a:solidFill>
+                  <a:schemeClr val="tx1"/>
+                </a:solidFill>
+                <a:latin typeface="Arial" panose="020B0604020202020204" pitchFamily="34" charset="0"/>
+              </a:defRPr>
+            </a:lvl4pPr>
+            <a:lvl5pPr eaLnBrk="0" fontAlgn="base" hangingPunct="0">
+              <a:spcBef>
+                <a:spcPct val="0"/>
+              </a:spcBef>
+              <a:spcAft>
+                <a:spcPct val="0"/>
+              </a:spcAft>
+              <a:defRPr>
+                <a:solidFill>
+                  <a:schemeClr val="tx1"/>
+                </a:solidFill>
+                <a:latin typeface="Arial" panose="020B0604020202020204" pitchFamily="34" charset="0"/>
+              </a:defRPr>
+            </a:lvl5pPr>
+            <a:lvl6pPr eaLnBrk="0" fontAlgn="base" hangingPunct="0">
+              <a:spcBef>
+                <a:spcPct val="0"/>
+              </a:spcBef>
+              <a:spcAft>
+                <a:spcPct val="0"/>
+              </a:spcAft>
+              <a:defRPr>
+                <a:solidFill>
+                  <a:schemeClr val="tx1"/>
+                </a:solidFill>
+                <a:latin typeface="Arial" panose="020B0604020202020204" pitchFamily="34" charset="0"/>
+              </a:defRPr>
+            </a:lvl6pPr>
+            <a:lvl7pPr eaLnBrk="0" fontAlgn="base" hangingPunct="0">
+              <a:spcBef>
+                <a:spcPct val="0"/>
+              </a:spcBef>
+              <a:spcAft>
+                <a:spcPct val="0"/>
+              </a:spcAft>
+              <a:defRPr>
+                <a:solidFill>
+                  <a:schemeClr val="tx1"/>
+                </a:solidFill>
+                <a:latin typeface="Arial" panose="020B0604020202020204" pitchFamily="34" charset="0"/>
+              </a:defRPr>
+            </a:lvl7pPr>
+            <a:lvl8pPr eaLnBrk="0" fontAlgn="base" hangingPunct="0">
+              <a:spcBef>
+                <a:spcPct val="0"/>
+              </a:spcBef>
+              <a:spcAft>
+                <a:spcPct val="0"/>
+              </a:spcAft>
+              <a:defRPr>
+                <a:solidFill>
+                  <a:schemeClr val="tx1"/>
+                </a:solidFill>
+                <a:latin typeface="Arial" panose="020B0604020202020204" pitchFamily="34" charset="0"/>
+              </a:defRPr>
+            </a:lvl8pPr>
+            <a:lvl9pPr eaLnBrk="0" fontAlgn="base" hangingPunct="0">
+              <a:spcBef>
+                <a:spcPct val="0"/>
+              </a:spcBef>
+              <a:spcAft>
+                <a:spcPct val="0"/>
+              </a:spcAft>
+              <a:defRPr>
+                <a:solidFill>
+                  <a:schemeClr val="tx1"/>
+                </a:solidFill>
+                <a:latin typeface="Arial" panose="020B0604020202020204" pitchFamily="34" charset="0"/>
+              </a:defRPr>
+            </a:lvl9pPr>
+          </a:lstStyle>
+          <a:p>
+            <a:pPr marL="0" marR="0" lvl="0" indent="0" algn="l" defTabSz="914400" rtl="0" eaLnBrk="0" fontAlgn="base" latinLnBrk="0" hangingPunct="0">
+              <a:lnSpc>
+                <a:spcPct val="100000"/>
+              </a:lnSpc>
+              <a:spcBef>
+                <a:spcPct val="0"/>
+              </a:spcBef>
+              <a:spcAft>
+                <a:spcPct val="0"/>
+              </a:spcAft>
+              <a:buClrTx/>
+              <a:buSzTx/>
+              <a:buFontTx/>
+              <a:buNone/>
+              <a:tabLst/>
+            </a:pPr>
+            <a:r>
+              <a:rPr kumimoji="0" lang="en-US" altLang="en-US" sz="1800" b="1" i="0" u="none" strike="noStrike" cap="none" normalizeH="0" baseline="0" dirty="0">
+                <a:ln>
+                  <a:noFill/>
+                </a:ln>
+                <a:solidFill>
+                  <a:srgbClr val="222222"/>
+                </a:solidFill>
+                <a:effectLst/>
+                <a:latin typeface="Arial" panose="020B0604020202020204" pitchFamily="34" charset="0"/>
+                <a:cs typeface="Arial" panose="020B0604020202020204" pitchFamily="34" charset="0"/>
+              </a:rPr>
+              <a:t>Architecture and presentation</a:t>
+            </a:r>
+            <a:endParaRPr kumimoji="0" lang="en-US" altLang="en-US" sz="1800" b="0" i="0" u="none" strike="noStrike" cap="none" normalizeH="0" baseline="0" dirty="0">
+              <a:ln>
+                <a:noFill/>
+              </a:ln>
+              <a:solidFill>
+                <a:schemeClr val="tx1"/>
+              </a:solidFill>
+              <a:effectLst/>
+            </a:endParaRPr>
+          </a:p>
+          <a:p>
+            <a:pPr marL="0" marR="0" lvl="0" indent="0" algn="l" defTabSz="914400" rtl="0" eaLnBrk="0" fontAlgn="base" latinLnBrk="0" hangingPunct="0">
+              <a:lnSpc>
+                <a:spcPct val="100000"/>
+              </a:lnSpc>
+              <a:spcBef>
+                <a:spcPct val="0"/>
+              </a:spcBef>
+              <a:spcAft>
+                <a:spcPct val="0"/>
+              </a:spcAft>
+              <a:buClrTx/>
+              <a:buSzTx/>
+              <a:buFontTx/>
+              <a:buNone/>
+              <a:tabLst/>
+            </a:pPr>
+            <a:r>
+              <a:rPr kumimoji="0" lang="en-US" altLang="en-US" sz="1800" b="0" i="0" u="none" strike="noStrike" cap="none" normalizeH="0" baseline="0" dirty="0">
+                <a:ln>
+                  <a:noFill/>
+                </a:ln>
+                <a:solidFill>
+                  <a:srgbClr val="1155CC"/>
+                </a:solidFill>
+                <a:effectLst/>
+                <a:latin typeface="Arial" panose="020B0604020202020204" pitchFamily="34" charset="0"/>
+                <a:cs typeface="Arial" panose="020B0604020202020204" pitchFamily="34" charset="0"/>
+                <a:hlinkClick r:id="rId2"/>
+              </a:rPr>
+              <a:t>https://github.com/VimalDwarampudi/campaign-management-system-docs</a:t>
+            </a:r>
+            <a:br>
+              <a:rPr kumimoji="0" lang="en-US" altLang="en-US" sz="1800" b="0" i="0" u="none" strike="noStrike" cap="none" normalizeH="0" baseline="0" dirty="0">
+                <a:ln>
+                  <a:noFill/>
+                </a:ln>
+                <a:solidFill>
+                  <a:srgbClr val="222222"/>
+                </a:solidFill>
+                <a:effectLst/>
+                <a:latin typeface="Arial" panose="020B0604020202020204" pitchFamily="34" charset="0"/>
+                <a:cs typeface="Arial" panose="020B0604020202020204" pitchFamily="34" charset="0"/>
+              </a:rPr>
+            </a:br>
+            <a:endParaRPr kumimoji="0" lang="en-US" altLang="en-US" sz="1800" b="0" i="0" u="none" strike="noStrike" cap="none" normalizeH="0" baseline="0" dirty="0">
+              <a:ln>
+                <a:noFill/>
+              </a:ln>
+              <a:solidFill>
+                <a:schemeClr val="tx1"/>
+              </a:solidFill>
+              <a:effectLst/>
+            </a:endParaRPr>
+          </a:p>
+          <a:p>
+            <a:pPr marL="0" marR="0" lvl="0" indent="0" algn="l" defTabSz="914400" rtl="0" eaLnBrk="0" fontAlgn="base" latinLnBrk="0" hangingPunct="0">
+              <a:lnSpc>
+                <a:spcPct val="100000"/>
+              </a:lnSpc>
+              <a:spcBef>
+                <a:spcPct val="0"/>
+              </a:spcBef>
+              <a:spcAft>
+                <a:spcPct val="0"/>
+              </a:spcAft>
+              <a:buClrTx/>
+              <a:buSzTx/>
+              <a:buFontTx/>
+              <a:buNone/>
+              <a:tabLst/>
+            </a:pPr>
+            <a:r>
+              <a:rPr kumimoji="0" lang="en-US" altLang="en-US" sz="1800" b="1" i="0" u="none" strike="noStrike" cap="none" normalizeH="0" baseline="0" dirty="0">
+                <a:ln>
+                  <a:noFill/>
+                </a:ln>
+                <a:solidFill>
+                  <a:srgbClr val="222222"/>
+                </a:solidFill>
+                <a:effectLst/>
+                <a:latin typeface="Arial" panose="020B0604020202020204" pitchFamily="34" charset="0"/>
+                <a:cs typeface="Arial" panose="020B0604020202020204" pitchFamily="34" charset="0"/>
+              </a:rPr>
+              <a:t>Code sample</a:t>
+            </a:r>
+            <a:endParaRPr kumimoji="0" lang="en-US" altLang="en-US" sz="1800" b="0" i="0" u="none" strike="noStrike" cap="none" normalizeH="0" baseline="0" dirty="0">
+              <a:ln>
+                <a:noFill/>
+              </a:ln>
+              <a:solidFill>
+                <a:schemeClr val="tx1"/>
+              </a:solidFill>
+              <a:effectLst/>
+            </a:endParaRPr>
+          </a:p>
+          <a:p>
+            <a:pPr marL="0" marR="0" lvl="0" indent="0" algn="l" defTabSz="914400" rtl="0" eaLnBrk="0" fontAlgn="base" latinLnBrk="0" hangingPunct="0">
+              <a:lnSpc>
+                <a:spcPct val="100000"/>
+              </a:lnSpc>
+              <a:spcBef>
+                <a:spcPct val="0"/>
+              </a:spcBef>
+              <a:spcAft>
+                <a:spcPct val="0"/>
+              </a:spcAft>
+              <a:buClrTx/>
+              <a:buSzTx/>
+              <a:buFontTx/>
+              <a:buNone/>
+              <a:tabLst/>
+            </a:pPr>
+            <a:r>
+              <a:rPr kumimoji="0" lang="en-US" altLang="en-US" sz="1800" b="0" i="0" u="none" strike="noStrike" cap="none" normalizeH="0" baseline="0" dirty="0">
+                <a:ln>
+                  <a:noFill/>
+                </a:ln>
+                <a:solidFill>
+                  <a:srgbClr val="1155CC"/>
+                </a:solidFill>
+                <a:effectLst/>
+                <a:latin typeface="Arial" panose="020B0604020202020204" pitchFamily="34" charset="0"/>
+                <a:cs typeface="Arial" panose="020B0604020202020204" pitchFamily="34" charset="0"/>
+                <a:hlinkClick r:id="rId3"/>
+              </a:rPr>
+              <a:t>https://github.com/VimalDwarampudi/db-pull-producer</a:t>
+            </a:r>
+            <a:br>
+              <a:rPr kumimoji="0" lang="en-US" altLang="en-US" sz="1800" b="1" i="0" u="none" strike="noStrike" cap="none" normalizeH="0" baseline="0" dirty="0">
+                <a:ln>
+                  <a:noFill/>
+                </a:ln>
+                <a:solidFill>
+                  <a:srgbClr val="222222"/>
+                </a:solidFill>
+                <a:effectLst/>
+                <a:latin typeface="Arial" panose="020B0604020202020204" pitchFamily="34" charset="0"/>
+                <a:cs typeface="Arial" panose="020B0604020202020204" pitchFamily="34" charset="0"/>
+              </a:rPr>
+            </a:br>
+            <a:endParaRPr kumimoji="0" lang="en-US" altLang="en-US" sz="1800" b="0" i="0" u="none" strike="noStrike" cap="none" normalizeH="0" baseline="0" dirty="0">
+              <a:ln>
+                <a:noFill/>
+              </a:ln>
+              <a:solidFill>
+                <a:schemeClr val="tx1"/>
+              </a:solidFill>
+              <a:effectLst/>
+            </a:endParaRPr>
+          </a:p>
+          <a:p>
+            <a:pPr marL="0" marR="0" lvl="0" indent="0" algn="l" defTabSz="914400" rtl="0" eaLnBrk="0" fontAlgn="base" latinLnBrk="0" hangingPunct="0">
+              <a:lnSpc>
+                <a:spcPct val="100000"/>
+              </a:lnSpc>
+              <a:spcBef>
+                <a:spcPct val="0"/>
+              </a:spcBef>
+              <a:spcAft>
+                <a:spcPct val="0"/>
+              </a:spcAft>
+              <a:buClrTx/>
+              <a:buSzTx/>
+              <a:buFontTx/>
+              <a:buNone/>
+              <a:tabLst/>
+            </a:pPr>
+            <a:r>
+              <a:rPr kumimoji="0" lang="en-US" altLang="en-US" sz="1800" b="0" i="0" u="none" strike="noStrike" cap="none" normalizeH="0" baseline="0" dirty="0">
+                <a:ln>
+                  <a:noFill/>
+                </a:ln>
+                <a:solidFill>
+                  <a:srgbClr val="1155CC"/>
+                </a:solidFill>
+                <a:effectLst/>
+                <a:latin typeface="Arial" panose="020B0604020202020204" pitchFamily="34" charset="0"/>
+                <a:cs typeface="Arial" panose="020B0604020202020204" pitchFamily="34" charset="0"/>
+                <a:hlinkClick r:id="rId4"/>
+              </a:rPr>
+              <a:t>https://github.com/VimalDwarampudi/send-email-processor</a:t>
+            </a:r>
+            <a:endParaRPr kumimoji="0" lang="en-US" altLang="en-US" sz="1800" b="0" i="0" u="none" strike="noStrike" cap="none" normalizeH="0" baseline="0" dirty="0">
+              <a:ln>
+                <a:noFill/>
+              </a:ln>
+              <a:solidFill>
+                <a:schemeClr val="tx1"/>
+              </a:solidFill>
+              <a:effectLst/>
+              <a:latin typeface="Arial" panose="020B0604020202020204" pitchFamily="34" charset="0"/>
+            </a:endParaRPr>
+          </a:p>
+        </p:txBody>
+      </p:sp>
+      <p:pic>
+        <p:nvPicPr>
+          <p:cNvPr id="6" name="Picture 5" descr="A screenshot of a computer&#10;&#10;Description automatically generated with medium confidence">
+            <a:extLst>
+              <a:ext uri="{FF2B5EF4-FFF2-40B4-BE49-F238E27FC236}">
+                <a16:creationId xmlns:a16="http://schemas.microsoft.com/office/drawing/2014/main" id="{E1E663EB-507C-7914-E62E-2AC3281C5F7D}"/>
+              </a:ext>
+            </a:extLst>
+          </p:cNvPr>
+          <p:cNvPicPr>
+            <a:picLocks noChangeAspect="1"/>
+          </p:cNvPicPr>
+          <p:nvPr/>
+        </p:nvPicPr>
+        <p:blipFill>
+          <a:blip r:embed="rId5">
+            <a:extLst>
+              <a:ext uri="{28A0092B-C50C-407E-A947-70E740481C1C}">
+                <a14:useLocalDpi xmlns:a14="http://schemas.microsoft.com/office/drawing/2010/main" val="0"/>
+              </a:ext>
+            </a:extLst>
+          </a:blip>
+          <a:stretch>
+            <a:fillRect/>
+          </a:stretch>
+        </p:blipFill>
+        <p:spPr>
+          <a:xfrm>
+            <a:off x="-272279" y="3745149"/>
+            <a:ext cx="5272296" cy="2630418"/>
+          </a:xfrm>
+          <a:prstGeom prst="rect">
+            <a:avLst/>
+          </a:prstGeom>
+        </p:spPr>
+      </p:pic>
+      <p:pic>
+        <p:nvPicPr>
+          <p:cNvPr id="8" name="Picture 7" descr="A screenshot of a computer&#10;&#10;Description automatically generated with medium confidence">
+            <a:extLst>
+              <a:ext uri="{FF2B5EF4-FFF2-40B4-BE49-F238E27FC236}">
+                <a16:creationId xmlns:a16="http://schemas.microsoft.com/office/drawing/2014/main" id="{7E47D4C3-87FF-39A8-9AE0-9C86329E8A3E}"/>
+              </a:ext>
+            </a:extLst>
+          </p:cNvPr>
+          <p:cNvPicPr>
+            <a:picLocks noChangeAspect="1"/>
+          </p:cNvPicPr>
+          <p:nvPr/>
+        </p:nvPicPr>
+        <p:blipFill>
+          <a:blip r:embed="rId6">
+            <a:extLst>
+              <a:ext uri="{28A0092B-C50C-407E-A947-70E740481C1C}">
+                <a14:useLocalDpi xmlns:a14="http://schemas.microsoft.com/office/drawing/2010/main" val="0"/>
+              </a:ext>
+            </a:extLst>
+          </a:blip>
+          <a:stretch>
+            <a:fillRect/>
+          </a:stretch>
+        </p:blipFill>
+        <p:spPr>
+          <a:xfrm>
+            <a:off x="5486400" y="3560684"/>
+            <a:ext cx="6459166" cy="3317535"/>
+          </a:xfrm>
+          <a:prstGeom prst="rect">
+            <a:avLst/>
+          </a:prstGeom>
+        </p:spPr>
+      </p:pic>
+    </p:spTree>
+    <p:extLst>
+      <p:ext uri="{BB962C8B-B14F-4D97-AF65-F5344CB8AC3E}">
+        <p14:creationId xmlns:p14="http://schemas.microsoft.com/office/powerpoint/2010/main" val="1824133271"/>
+      </p:ext>
+    </p:extLst>
+  </p:cSld>
+  <p:clrMapOvr>
+    <a:masterClrMapping/>
+  </p:clrMapOvr>
+</p:sld>
+</file>
+
 <file path=ppt/theme/theme1.xml><?xml version="1.0" encoding="utf-8"?>
 <a:theme xmlns:a="http://schemas.openxmlformats.org/drawingml/2006/main" name="Office Theme">
   <a:themeElements>

</xml_diff>